<commit_message>
Updated rate demo and deck
</commit_message>
<xml_diff>
--- a/decks/Kendo UI and Angular - Likness.pptx
+++ b/decks/Kendo UI and Angular - Likness.pptx
@@ -5,10 +5,10 @@
     <p:sldMasterId id="2147483660" r:id="rId2"/>
   </p:sldMasterIdLst>
   <p:notesMasterIdLst>
-    <p:notesMasterId r:id="rId16"/>
+    <p:notesMasterId r:id="rId17"/>
   </p:notesMasterIdLst>
   <p:handoutMasterIdLst>
-    <p:handoutMasterId r:id="rId17"/>
+    <p:handoutMasterId r:id="rId18"/>
   </p:handoutMasterIdLst>
   <p:sldIdLst>
     <p:sldId id="257" r:id="rId3"/>
@@ -23,7 +23,8 @@
     <p:sldId id="290" r:id="rId12"/>
     <p:sldId id="274" r:id="rId13"/>
     <p:sldId id="276" r:id="rId14"/>
-    <p:sldId id="265" r:id="rId15"/>
+    <p:sldId id="293" r:id="rId15"/>
+    <p:sldId id="265" r:id="rId16"/>
   </p:sldIdLst>
   <p:sldSz cx="12188825" cy="6858000"/>
   <p:notesSz cx="6858000" cy="9144000"/>
@@ -9436,7 +9437,6 @@
               <a:rPr lang="en-US" dirty="0" smtClean="0"/>
               <a:t>They say it isn’t fair: women burn fewer calories at rest than men with a similar height and weight</a:t>
             </a:r>
-            <a:endParaRPr lang="en-US" dirty="0" smtClean="0"/>
           </a:p>
           <a:p>
             <a:r>
@@ -9461,7 +9461,6 @@
               <a:rPr lang="en-US" dirty="0" smtClean="0"/>
               <a:t>Use k-widget-property to set Widget properties</a:t>
             </a:r>
-            <a:endParaRPr lang="en-US" dirty="0" smtClean="0"/>
           </a:p>
         </p:txBody>
       </p:sp>
@@ -9815,6 +9814,101 @@
 </file>
 
 <file path=ppt/slides/slide13.xml><?xml version="1.0" encoding="utf-8"?>
+<p:sld xmlns:a="http://schemas.openxmlformats.org/drawingml/2006/main" xmlns:r="http://schemas.openxmlformats.org/officeDocument/2006/relationships" xmlns:p="http://schemas.openxmlformats.org/presentationml/2006/main">
+  <p:cSld>
+    <p:spTree>
+      <p:nvGrpSpPr>
+        <p:cNvPr id="1" name=""/>
+        <p:cNvGrpSpPr/>
+        <p:nvPr/>
+      </p:nvGrpSpPr>
+      <p:grpSpPr>
+        <a:xfrm>
+          <a:off x="0" y="0"/>
+          <a:ext cx="0" cy="0"/>
+          <a:chOff x="0" y="0"/>
+          <a:chExt cx="0" cy="0"/>
+        </a:xfrm>
+      </p:grpSpPr>
+      <p:sp>
+        <p:nvSpPr>
+          <p:cNvPr id="4" name="Title 3"/>
+          <p:cNvSpPr>
+            <a:spLocks noGrp="1"/>
+          </p:cNvSpPr>
+          <p:nvPr>
+            <p:ph type="title"/>
+          </p:nvPr>
+        </p:nvSpPr>
+        <p:spPr/>
+        <p:txBody>
+          <a:bodyPr/>
+          <a:lstStyle/>
+          <a:p>
+            <a:r>
+              <a:rPr lang="en-US" dirty="0" smtClean="0"/>
+              <a:t>BONUS DEMO</a:t>
+            </a:r>
+            <a:endParaRPr lang="en-US" dirty="0"/>
+          </a:p>
+        </p:txBody>
+      </p:sp>
+      <p:sp>
+        <p:nvSpPr>
+          <p:cNvPr id="5" name="Text Placeholder 4"/>
+          <p:cNvSpPr>
+            <a:spLocks noGrp="1"/>
+          </p:cNvSpPr>
+          <p:nvPr>
+            <p:ph type="body" idx="1"/>
+          </p:nvPr>
+        </p:nvSpPr>
+        <p:spPr/>
+        <p:txBody>
+          <a:bodyPr/>
+          <a:lstStyle/>
+          <a:p>
+            <a:r>
+              <a:rPr lang="en-US" dirty="0" smtClean="0"/>
+              <a:t>The Rate Grid, Refactored</a:t>
+            </a:r>
+            <a:endParaRPr lang="en-US" dirty="0"/>
+          </a:p>
+        </p:txBody>
+      </p:sp>
+    </p:spTree>
+    <p:extLst>
+      <p:ext uri="{BB962C8B-B14F-4D97-AF65-F5344CB8AC3E}">
+        <p14:creationId xmlns:p14="http://schemas.microsoft.com/office/powerpoint/2010/main" val="4201754664"/>
+      </p:ext>
+    </p:extLst>
+  </p:cSld>
+  <p:clrMapOvr>
+    <a:masterClrMapping/>
+  </p:clrMapOvr>
+  <mc:AlternateContent xmlns:mc="http://schemas.openxmlformats.org/markup-compatibility/2006" xmlns:p14="http://schemas.microsoft.com/office/powerpoint/2010/main">
+    <mc:Choice Requires="p14">
+      <p:transition spd="med" p14:dur="700">
+        <p:fade/>
+      </p:transition>
+    </mc:Choice>
+    <mc:Fallback xmlns="">
+      <p:transition spd="med">
+        <p:fade/>
+      </p:transition>
+    </mc:Fallback>
+  </mc:AlternateContent>
+  <p:timing>
+    <p:tnLst>
+      <p:par>
+        <p:cTn id="1" dur="indefinite" restart="never" nodeType="tmRoot"/>
+      </p:par>
+    </p:tnLst>
+  </p:timing>
+</p:sld>
+</file>
+
+<file path=ppt/slides/slide14.xml><?xml version="1.0" encoding="utf-8"?>
 <p:sld xmlns:a="http://schemas.openxmlformats.org/drawingml/2006/main" xmlns:r="http://schemas.openxmlformats.org/officeDocument/2006/relationships" xmlns:p="http://schemas.openxmlformats.org/presentationml/2006/main">
   <p:cSld>
     <p:spTree>
@@ -11941,13 +12035,13 @@
   <p:clrMapOvr>
     <a:masterClrMapping/>
   </p:clrMapOvr>
-  <mc:AlternateContent xmlns:mc="http://schemas.openxmlformats.org/markup-compatibility/2006">
-    <mc:Choice xmlns:p14="http://schemas.microsoft.com/office/powerpoint/2010/main" Requires="p14">
+  <mc:AlternateContent xmlns:mc="http://schemas.openxmlformats.org/markup-compatibility/2006" xmlns:p14="http://schemas.microsoft.com/office/powerpoint/2010/main">
+    <mc:Choice Requires="p14">
       <p:transition spd="med" p14:dur="700">
         <p:fade/>
       </p:transition>
     </mc:Choice>
-    <mc:Fallback>
+    <mc:Fallback xmlns="">
       <p:transition spd="med">
         <p:fade/>
       </p:transition>

</xml_diff>

<commit_message>
Tweaks for Angular deck
</commit_message>
<xml_diff>
--- a/decks/Kendo UI and Angular - Likness.pptx
+++ b/decks/Kendo UI and Angular - Likness.pptx
@@ -1469,696 +1469,6 @@
       <dsp:cNvGrpSpPr/>
     </dsp:nvGrpSpPr>
     <dsp:grpSpPr/>
-    <dsp:sp modelId="{96BD0D40-FD3E-4CE4-8564-EF5CF59F3994}">
-      <dsp:nvSpPr>
-        <dsp:cNvPr id="0" name=""/>
-        <dsp:cNvSpPr/>
-      </dsp:nvSpPr>
-      <dsp:spPr>
-        <a:xfrm>
-          <a:off x="2443613" y="2688315"/>
-          <a:ext cx="1051513" cy="500425"/>
-        </a:xfrm>
-        <a:custGeom>
-          <a:avLst/>
-          <a:gdLst/>
-          <a:ahLst/>
-          <a:cxnLst/>
-          <a:rect l="0" t="0" r="0" b="0"/>
-          <a:pathLst>
-            <a:path>
-              <a:moveTo>
-                <a:pt x="0" y="0"/>
-              </a:moveTo>
-              <a:lnTo>
-                <a:pt x="0" y="341025"/>
-              </a:lnTo>
-              <a:lnTo>
-                <a:pt x="1051513" y="341025"/>
-              </a:lnTo>
-              <a:lnTo>
-                <a:pt x="1051513" y="500425"/>
-              </a:lnTo>
-            </a:path>
-          </a:pathLst>
-        </a:custGeom>
-        <a:noFill/>
-        <a:ln w="25400" cap="flat" cmpd="sng" algn="ctr">
-          <a:solidFill>
-            <a:schemeClr val="accent3">
-              <a:hueOff val="0"/>
-              <a:satOff val="0"/>
-              <a:lumOff val="0"/>
-              <a:alphaOff val="0"/>
-            </a:schemeClr>
-          </a:solidFill>
-          <a:miter lim="800000"/>
-        </a:ln>
-        <a:effectLst/>
-      </dsp:spPr>
-      <dsp:style>
-        <a:lnRef idx="2">
-          <a:scrgbClr r="0" g="0" b="0"/>
-        </a:lnRef>
-        <a:fillRef idx="0">
-          <a:scrgbClr r="0" g="0" b="0"/>
-        </a:fillRef>
-        <a:effectRef idx="0">
-          <a:scrgbClr r="0" g="0" b="0"/>
-        </a:effectRef>
-        <a:fontRef idx="minor"/>
-      </dsp:style>
-    </dsp:sp>
-    <dsp:sp modelId="{F3C4E48F-1252-45BF-B0CE-EF678A99F244}">
-      <dsp:nvSpPr>
-        <dsp:cNvPr id="0" name=""/>
-        <dsp:cNvSpPr/>
-      </dsp:nvSpPr>
-      <dsp:spPr>
-        <a:xfrm>
-          <a:off x="1392099" y="2688315"/>
-          <a:ext cx="1051513" cy="500425"/>
-        </a:xfrm>
-        <a:custGeom>
-          <a:avLst/>
-          <a:gdLst/>
-          <a:ahLst/>
-          <a:cxnLst/>
-          <a:rect l="0" t="0" r="0" b="0"/>
-          <a:pathLst>
-            <a:path>
-              <a:moveTo>
-                <a:pt x="1051513" y="0"/>
-              </a:moveTo>
-              <a:lnTo>
-                <a:pt x="1051513" y="341025"/>
-              </a:lnTo>
-              <a:lnTo>
-                <a:pt x="0" y="341025"/>
-              </a:lnTo>
-              <a:lnTo>
-                <a:pt x="0" y="500425"/>
-              </a:lnTo>
-            </a:path>
-          </a:pathLst>
-        </a:custGeom>
-        <a:noFill/>
-        <a:ln w="25400" cap="flat" cmpd="sng" algn="ctr">
-          <a:solidFill>
-            <a:schemeClr val="accent3">
-              <a:hueOff val="0"/>
-              <a:satOff val="0"/>
-              <a:lumOff val="0"/>
-              <a:alphaOff val="0"/>
-            </a:schemeClr>
-          </a:solidFill>
-          <a:miter lim="800000"/>
-        </a:ln>
-        <a:effectLst/>
-      </dsp:spPr>
-      <dsp:style>
-        <a:lnRef idx="2">
-          <a:scrgbClr r="0" g="0" b="0"/>
-        </a:lnRef>
-        <a:fillRef idx="0">
-          <a:scrgbClr r="0" g="0" b="0"/>
-        </a:fillRef>
-        <a:effectRef idx="0">
-          <a:scrgbClr r="0" g="0" b="0"/>
-        </a:effectRef>
-        <a:fontRef idx="minor"/>
-      </dsp:style>
-    </dsp:sp>
-    <dsp:sp modelId="{0E75C3AB-6E3A-4DE2-B868-851B2CC2BD7D}">
-      <dsp:nvSpPr>
-        <dsp:cNvPr id="0" name=""/>
-        <dsp:cNvSpPr/>
-      </dsp:nvSpPr>
-      <dsp:spPr>
-        <a:xfrm>
-          <a:off x="2397893" y="1095271"/>
-          <a:ext cx="91440" cy="500425"/>
-        </a:xfrm>
-        <a:custGeom>
-          <a:avLst/>
-          <a:gdLst/>
-          <a:ahLst/>
-          <a:cxnLst/>
-          <a:rect l="0" t="0" r="0" b="0"/>
-          <a:pathLst>
-            <a:path>
-              <a:moveTo>
-                <a:pt x="45720" y="0"/>
-              </a:moveTo>
-              <a:lnTo>
-                <a:pt x="45720" y="500425"/>
-              </a:lnTo>
-            </a:path>
-          </a:pathLst>
-        </a:custGeom>
-        <a:noFill/>
-        <a:ln w="25400" cap="flat" cmpd="sng" algn="ctr">
-          <a:solidFill>
-            <a:schemeClr val="accent2">
-              <a:hueOff val="0"/>
-              <a:satOff val="0"/>
-              <a:lumOff val="0"/>
-              <a:alphaOff val="0"/>
-            </a:schemeClr>
-          </a:solidFill>
-          <a:miter lim="800000"/>
-        </a:ln>
-        <a:effectLst/>
-      </dsp:spPr>
-      <dsp:style>
-        <a:lnRef idx="2">
-          <a:scrgbClr r="0" g="0" b="0"/>
-        </a:lnRef>
-        <a:fillRef idx="0">
-          <a:scrgbClr r="0" g="0" b="0"/>
-        </a:fillRef>
-        <a:effectRef idx="0">
-          <a:scrgbClr r="0" g="0" b="0"/>
-        </a:effectRef>
-        <a:fontRef idx="minor"/>
-      </dsp:style>
-    </dsp:sp>
-    <dsp:sp modelId="{58EB7143-1B89-4428-A27D-D98815D64FC4}">
-      <dsp:nvSpPr>
-        <dsp:cNvPr id="0" name=""/>
-        <dsp:cNvSpPr/>
-      </dsp:nvSpPr>
-      <dsp:spPr>
-        <a:xfrm>
-          <a:off x="1583284" y="2652"/>
-          <a:ext cx="1720659" cy="1092618"/>
-        </a:xfrm>
-        <a:prstGeom prst="roundRect">
-          <a:avLst>
-            <a:gd name="adj" fmla="val 10000"/>
-          </a:avLst>
-        </a:prstGeom>
-        <a:solidFill>
-          <a:schemeClr val="accent1">
-            <a:hueOff val="0"/>
-            <a:satOff val="0"/>
-            <a:lumOff val="0"/>
-            <a:alphaOff val="0"/>
-          </a:schemeClr>
-        </a:solidFill>
-        <a:ln w="25400" cap="flat" cmpd="sng" algn="ctr">
-          <a:solidFill>
-            <a:schemeClr val="lt1">
-              <a:hueOff val="0"/>
-              <a:satOff val="0"/>
-              <a:lumOff val="0"/>
-              <a:alphaOff val="0"/>
-            </a:schemeClr>
-          </a:solidFill>
-          <a:miter lim="800000"/>
-        </a:ln>
-        <a:effectLst/>
-      </dsp:spPr>
-      <dsp:style>
-        <a:lnRef idx="2">
-          <a:scrgbClr r="0" g="0" b="0"/>
-        </a:lnRef>
-        <a:fillRef idx="1">
-          <a:scrgbClr r="0" g="0" b="0"/>
-        </a:fillRef>
-        <a:effectRef idx="0">
-          <a:scrgbClr r="0" g="0" b="0"/>
-        </a:effectRef>
-        <a:fontRef idx="minor">
-          <a:schemeClr val="lt1"/>
-        </a:fontRef>
-      </dsp:style>
-    </dsp:sp>
-    <dsp:sp modelId="{BCB778B2-FB72-4C06-A885-3C67BC80AC2F}">
-      <dsp:nvSpPr>
-        <dsp:cNvPr id="0" name=""/>
-        <dsp:cNvSpPr/>
-      </dsp:nvSpPr>
-      <dsp:spPr>
-        <a:xfrm>
-          <a:off x="1774468" y="184278"/>
-          <a:ext cx="1720659" cy="1092618"/>
-        </a:xfrm>
-        <a:prstGeom prst="roundRect">
-          <a:avLst>
-            <a:gd name="adj" fmla="val 10000"/>
-          </a:avLst>
-        </a:prstGeom>
-        <a:solidFill>
-          <a:schemeClr val="lt1">
-            <a:alpha val="90000"/>
-            <a:hueOff val="0"/>
-            <a:satOff val="0"/>
-            <a:lumOff val="0"/>
-            <a:alphaOff val="0"/>
-          </a:schemeClr>
-        </a:solidFill>
-        <a:ln w="25400" cap="flat" cmpd="sng" algn="ctr">
-          <a:solidFill>
-            <a:schemeClr val="accent1">
-              <a:hueOff val="0"/>
-              <a:satOff val="0"/>
-              <a:lumOff val="0"/>
-              <a:alphaOff val="0"/>
-            </a:schemeClr>
-          </a:solidFill>
-          <a:miter lim="800000"/>
-        </a:ln>
-        <a:effectLst/>
-      </dsp:spPr>
-      <dsp:style>
-        <a:lnRef idx="2">
-          <a:scrgbClr r="0" g="0" b="0"/>
-        </a:lnRef>
-        <a:fillRef idx="1">
-          <a:scrgbClr r="0" g="0" b="0"/>
-        </a:fillRef>
-        <a:effectRef idx="0">
-          <a:scrgbClr r="0" g="0" b="0"/>
-        </a:effectRef>
-        <a:fontRef idx="minor"/>
-      </dsp:style>
-      <dsp:txBody>
-        <a:bodyPr spcFirstLastPara="0" vert="horz" wrap="square" lIns="106680" tIns="106680" rIns="106680" bIns="106680" numCol="1" spcCol="1270" anchor="ctr" anchorCtr="0">
-          <a:noAutofit/>
-        </a:bodyPr>
-        <a:lstStyle/>
-        <a:p>
-          <a:pPr lvl="0" algn="ctr" defTabSz="1244600">
-            <a:lnSpc>
-              <a:spcPct val="90000"/>
-            </a:lnSpc>
-            <a:spcBef>
-              <a:spcPct val="0"/>
-            </a:spcBef>
-            <a:spcAft>
-              <a:spcPct val="35000"/>
-            </a:spcAft>
-          </a:pPr>
-          <a:r>
-            <a:rPr lang="en-US" sz="2800" kern="1200" dirty="0" smtClean="0"/>
-            <a:t>Browser</a:t>
-          </a:r>
-          <a:endParaRPr lang="en-US" sz="2800" kern="1200" dirty="0"/>
-        </a:p>
-      </dsp:txBody>
-      <dsp:txXfrm>
-        <a:off x="1806470" y="216280"/>
-        <a:ext cx="1656655" cy="1028614"/>
-      </dsp:txXfrm>
-    </dsp:sp>
-    <dsp:sp modelId="{DD67E1E4-9026-446A-AAFA-41E2BAF10060}">
-      <dsp:nvSpPr>
-        <dsp:cNvPr id="0" name=""/>
-        <dsp:cNvSpPr/>
-      </dsp:nvSpPr>
-      <dsp:spPr>
-        <a:xfrm>
-          <a:off x="1583284" y="1595696"/>
-          <a:ext cx="1720659" cy="1092618"/>
-        </a:xfrm>
-        <a:prstGeom prst="roundRect">
-          <a:avLst>
-            <a:gd name="adj" fmla="val 10000"/>
-          </a:avLst>
-        </a:prstGeom>
-        <a:solidFill>
-          <a:schemeClr val="accent2">
-            <a:hueOff val="0"/>
-            <a:satOff val="0"/>
-            <a:lumOff val="0"/>
-            <a:alphaOff val="0"/>
-          </a:schemeClr>
-        </a:solidFill>
-        <a:ln w="25400" cap="flat" cmpd="sng" algn="ctr">
-          <a:solidFill>
-            <a:schemeClr val="lt1">
-              <a:hueOff val="0"/>
-              <a:satOff val="0"/>
-              <a:lumOff val="0"/>
-              <a:alphaOff val="0"/>
-            </a:schemeClr>
-          </a:solidFill>
-          <a:miter lim="800000"/>
-        </a:ln>
-        <a:effectLst/>
-      </dsp:spPr>
-      <dsp:style>
-        <a:lnRef idx="2">
-          <a:scrgbClr r="0" g="0" b="0"/>
-        </a:lnRef>
-        <a:fillRef idx="1">
-          <a:scrgbClr r="0" g="0" b="0"/>
-        </a:fillRef>
-        <a:effectRef idx="0">
-          <a:scrgbClr r="0" g="0" b="0"/>
-        </a:effectRef>
-        <a:fontRef idx="minor">
-          <a:schemeClr val="lt1"/>
-        </a:fontRef>
-      </dsp:style>
-    </dsp:sp>
-    <dsp:sp modelId="{6D5775D2-3C6D-4CF7-8B39-07FFDF059CBB}">
-      <dsp:nvSpPr>
-        <dsp:cNvPr id="0" name=""/>
-        <dsp:cNvSpPr/>
-      </dsp:nvSpPr>
-      <dsp:spPr>
-        <a:xfrm>
-          <a:off x="1774468" y="1777321"/>
-          <a:ext cx="1720659" cy="1092618"/>
-        </a:xfrm>
-        <a:prstGeom prst="roundRect">
-          <a:avLst>
-            <a:gd name="adj" fmla="val 10000"/>
-          </a:avLst>
-        </a:prstGeom>
-        <a:solidFill>
-          <a:schemeClr val="lt1">
-            <a:alpha val="90000"/>
-            <a:hueOff val="0"/>
-            <a:satOff val="0"/>
-            <a:lumOff val="0"/>
-            <a:alphaOff val="0"/>
-          </a:schemeClr>
-        </a:solidFill>
-        <a:ln w="25400" cap="flat" cmpd="sng" algn="ctr">
-          <a:solidFill>
-            <a:schemeClr val="accent2">
-              <a:hueOff val="0"/>
-              <a:satOff val="0"/>
-              <a:lumOff val="0"/>
-              <a:alphaOff val="0"/>
-            </a:schemeClr>
-          </a:solidFill>
-          <a:miter lim="800000"/>
-        </a:ln>
-        <a:effectLst/>
-      </dsp:spPr>
-      <dsp:style>
-        <a:lnRef idx="2">
-          <a:scrgbClr r="0" g="0" b="0"/>
-        </a:lnRef>
-        <a:fillRef idx="1">
-          <a:scrgbClr r="0" g="0" b="0"/>
-        </a:fillRef>
-        <a:effectRef idx="0">
-          <a:scrgbClr r="0" g="0" b="0"/>
-        </a:effectRef>
-        <a:fontRef idx="minor"/>
-      </dsp:style>
-      <dsp:txBody>
-        <a:bodyPr spcFirstLastPara="0" vert="horz" wrap="square" lIns="106680" tIns="106680" rIns="106680" bIns="106680" numCol="1" spcCol="1270" anchor="ctr" anchorCtr="0">
-          <a:noAutofit/>
-        </a:bodyPr>
-        <a:lstStyle/>
-        <a:p>
-          <a:pPr lvl="0" algn="ctr" defTabSz="1244600">
-            <a:lnSpc>
-              <a:spcPct val="90000"/>
-            </a:lnSpc>
-            <a:spcBef>
-              <a:spcPct val="0"/>
-            </a:spcBef>
-            <a:spcAft>
-              <a:spcPct val="35000"/>
-            </a:spcAft>
-          </a:pPr>
-          <a:r>
-            <a:rPr lang="en-US" sz="2800" kern="1200" dirty="0" smtClean="0"/>
-            <a:t>jQuery</a:t>
-          </a:r>
-          <a:endParaRPr lang="en-US" sz="2800" kern="1200" dirty="0"/>
-        </a:p>
-      </dsp:txBody>
-      <dsp:txXfrm>
-        <a:off x="1806470" y="1809323"/>
-        <a:ext cx="1656655" cy="1028614"/>
-      </dsp:txXfrm>
-    </dsp:sp>
-    <dsp:sp modelId="{8562BAD1-FA6F-4BA7-8076-3CEEA0C6C58B}">
-      <dsp:nvSpPr>
-        <dsp:cNvPr id="0" name=""/>
-        <dsp:cNvSpPr/>
-      </dsp:nvSpPr>
-      <dsp:spPr>
-        <a:xfrm>
-          <a:off x="531770" y="3188740"/>
-          <a:ext cx="1720659" cy="1092618"/>
-        </a:xfrm>
-        <a:prstGeom prst="roundRect">
-          <a:avLst>
-            <a:gd name="adj" fmla="val 10000"/>
-          </a:avLst>
-        </a:prstGeom>
-        <a:solidFill>
-          <a:schemeClr val="accent3">
-            <a:hueOff val="0"/>
-            <a:satOff val="0"/>
-            <a:lumOff val="0"/>
-            <a:alphaOff val="0"/>
-          </a:schemeClr>
-        </a:solidFill>
-        <a:ln w="25400" cap="flat" cmpd="sng" algn="ctr">
-          <a:solidFill>
-            <a:schemeClr val="lt1">
-              <a:hueOff val="0"/>
-              <a:satOff val="0"/>
-              <a:lumOff val="0"/>
-              <a:alphaOff val="0"/>
-            </a:schemeClr>
-          </a:solidFill>
-          <a:miter lim="800000"/>
-        </a:ln>
-        <a:effectLst/>
-      </dsp:spPr>
-      <dsp:style>
-        <a:lnRef idx="2">
-          <a:scrgbClr r="0" g="0" b="0"/>
-        </a:lnRef>
-        <a:fillRef idx="1">
-          <a:scrgbClr r="0" g="0" b="0"/>
-        </a:fillRef>
-        <a:effectRef idx="0">
-          <a:scrgbClr r="0" g="0" b="0"/>
-        </a:effectRef>
-        <a:fontRef idx="minor">
-          <a:schemeClr val="lt1"/>
-        </a:fontRef>
-      </dsp:style>
-    </dsp:sp>
-    <dsp:sp modelId="{E97CB177-EA84-4CEB-B290-BFB40E3DBD67}">
-      <dsp:nvSpPr>
-        <dsp:cNvPr id="0" name=""/>
-        <dsp:cNvSpPr/>
-      </dsp:nvSpPr>
-      <dsp:spPr>
-        <a:xfrm>
-          <a:off x="722954" y="3370365"/>
-          <a:ext cx="1720659" cy="1092618"/>
-        </a:xfrm>
-        <a:prstGeom prst="roundRect">
-          <a:avLst>
-            <a:gd name="adj" fmla="val 10000"/>
-          </a:avLst>
-        </a:prstGeom>
-        <a:solidFill>
-          <a:schemeClr val="lt1">
-            <a:alpha val="90000"/>
-            <a:hueOff val="0"/>
-            <a:satOff val="0"/>
-            <a:lumOff val="0"/>
-            <a:alphaOff val="0"/>
-          </a:schemeClr>
-        </a:solidFill>
-        <a:ln w="25400" cap="flat" cmpd="sng" algn="ctr">
-          <a:solidFill>
-            <a:schemeClr val="accent3">
-              <a:hueOff val="0"/>
-              <a:satOff val="0"/>
-              <a:lumOff val="0"/>
-              <a:alphaOff val="0"/>
-            </a:schemeClr>
-          </a:solidFill>
-          <a:miter lim="800000"/>
-        </a:ln>
-        <a:effectLst/>
-      </dsp:spPr>
-      <dsp:style>
-        <a:lnRef idx="2">
-          <a:scrgbClr r="0" g="0" b="0"/>
-        </a:lnRef>
-        <a:fillRef idx="1">
-          <a:scrgbClr r="0" g="0" b="0"/>
-        </a:fillRef>
-        <a:effectRef idx="0">
-          <a:scrgbClr r="0" g="0" b="0"/>
-        </a:effectRef>
-        <a:fontRef idx="minor"/>
-      </dsp:style>
-      <dsp:txBody>
-        <a:bodyPr spcFirstLastPara="0" vert="horz" wrap="square" lIns="106680" tIns="106680" rIns="106680" bIns="106680" numCol="1" spcCol="1270" anchor="ctr" anchorCtr="0">
-          <a:noAutofit/>
-        </a:bodyPr>
-        <a:lstStyle/>
-        <a:p>
-          <a:pPr lvl="0" algn="ctr" defTabSz="1244600">
-            <a:lnSpc>
-              <a:spcPct val="90000"/>
-            </a:lnSpc>
-            <a:spcBef>
-              <a:spcPct val="0"/>
-            </a:spcBef>
-            <a:spcAft>
-              <a:spcPct val="35000"/>
-            </a:spcAft>
-          </a:pPr>
-          <a:r>
-            <a:rPr lang="en-US" sz="2800" kern="1200" dirty="0" smtClean="0"/>
-            <a:t>AngularJS</a:t>
-          </a:r>
-          <a:endParaRPr lang="en-US" sz="2800" kern="1200" dirty="0"/>
-        </a:p>
-      </dsp:txBody>
-      <dsp:txXfrm>
-        <a:off x="754956" y="3402367"/>
-        <a:ext cx="1656655" cy="1028614"/>
-      </dsp:txXfrm>
-    </dsp:sp>
-    <dsp:sp modelId="{7132BFE6-AFB0-4E07-83A0-AC6017F89A9D}">
-      <dsp:nvSpPr>
-        <dsp:cNvPr id="0" name=""/>
-        <dsp:cNvSpPr/>
-      </dsp:nvSpPr>
-      <dsp:spPr>
-        <a:xfrm>
-          <a:off x="2634798" y="3188740"/>
-          <a:ext cx="1720659" cy="1092618"/>
-        </a:xfrm>
-        <a:prstGeom prst="roundRect">
-          <a:avLst>
-            <a:gd name="adj" fmla="val 10000"/>
-          </a:avLst>
-        </a:prstGeom>
-        <a:solidFill>
-          <a:schemeClr val="accent3">
-            <a:hueOff val="0"/>
-            <a:satOff val="0"/>
-            <a:lumOff val="0"/>
-            <a:alphaOff val="0"/>
-          </a:schemeClr>
-        </a:solidFill>
-        <a:ln w="25400" cap="flat" cmpd="sng" algn="ctr">
-          <a:solidFill>
-            <a:schemeClr val="lt1">
-              <a:hueOff val="0"/>
-              <a:satOff val="0"/>
-              <a:lumOff val="0"/>
-              <a:alphaOff val="0"/>
-            </a:schemeClr>
-          </a:solidFill>
-          <a:miter lim="800000"/>
-        </a:ln>
-        <a:effectLst/>
-      </dsp:spPr>
-      <dsp:style>
-        <a:lnRef idx="2">
-          <a:scrgbClr r="0" g="0" b="0"/>
-        </a:lnRef>
-        <a:fillRef idx="1">
-          <a:scrgbClr r="0" g="0" b="0"/>
-        </a:fillRef>
-        <a:effectRef idx="0">
-          <a:scrgbClr r="0" g="0" b="0"/>
-        </a:effectRef>
-        <a:fontRef idx="minor">
-          <a:schemeClr val="lt1"/>
-        </a:fontRef>
-      </dsp:style>
-    </dsp:sp>
-    <dsp:sp modelId="{D086800B-E69A-4A2C-8467-B6B1F4B7CD0D}">
-      <dsp:nvSpPr>
-        <dsp:cNvPr id="0" name=""/>
-        <dsp:cNvSpPr/>
-      </dsp:nvSpPr>
-      <dsp:spPr>
-        <a:xfrm>
-          <a:off x="2825982" y="3370365"/>
-          <a:ext cx="1720659" cy="1092618"/>
-        </a:xfrm>
-        <a:prstGeom prst="roundRect">
-          <a:avLst>
-            <a:gd name="adj" fmla="val 10000"/>
-          </a:avLst>
-        </a:prstGeom>
-        <a:solidFill>
-          <a:schemeClr val="lt1">
-            <a:alpha val="90000"/>
-            <a:hueOff val="0"/>
-            <a:satOff val="0"/>
-            <a:lumOff val="0"/>
-            <a:alphaOff val="0"/>
-          </a:schemeClr>
-        </a:solidFill>
-        <a:ln w="25400" cap="flat" cmpd="sng" algn="ctr">
-          <a:solidFill>
-            <a:schemeClr val="accent3">
-              <a:hueOff val="0"/>
-              <a:satOff val="0"/>
-              <a:lumOff val="0"/>
-              <a:alphaOff val="0"/>
-            </a:schemeClr>
-          </a:solidFill>
-          <a:miter lim="800000"/>
-        </a:ln>
-        <a:effectLst/>
-      </dsp:spPr>
-      <dsp:style>
-        <a:lnRef idx="2">
-          <a:scrgbClr r="0" g="0" b="0"/>
-        </a:lnRef>
-        <a:fillRef idx="1">
-          <a:scrgbClr r="0" g="0" b="0"/>
-        </a:fillRef>
-        <a:effectRef idx="0">
-          <a:scrgbClr r="0" g="0" b="0"/>
-        </a:effectRef>
-        <a:fontRef idx="minor"/>
-      </dsp:style>
-      <dsp:txBody>
-        <a:bodyPr spcFirstLastPara="0" vert="horz" wrap="square" lIns="106680" tIns="106680" rIns="106680" bIns="106680" numCol="1" spcCol="1270" anchor="ctr" anchorCtr="0">
-          <a:noAutofit/>
-        </a:bodyPr>
-        <a:lstStyle/>
-        <a:p>
-          <a:pPr lvl="0" algn="ctr" defTabSz="1244600">
-            <a:lnSpc>
-              <a:spcPct val="90000"/>
-            </a:lnSpc>
-            <a:spcBef>
-              <a:spcPct val="0"/>
-            </a:spcBef>
-            <a:spcAft>
-              <a:spcPct val="35000"/>
-            </a:spcAft>
-          </a:pPr>
-          <a:r>
-            <a:rPr lang="en-US" sz="2800" kern="1200" dirty="0" smtClean="0"/>
-            <a:t>Kendo UI</a:t>
-          </a:r>
-          <a:endParaRPr lang="en-US" sz="2800" kern="1200" dirty="0"/>
-        </a:p>
-      </dsp:txBody>
-      <dsp:txXfrm>
-        <a:off x="2857984" y="3402367"/>
-        <a:ext cx="1656655" cy="1028614"/>
-      </dsp:txXfrm>
-    </dsp:sp>
   </dsp:spTree>
 </dsp:drawing>
 </file>
@@ -3842,7 +3152,7 @@
           <a:p>
             <a:fld id="{FE5B4EDC-59C0-49C7-8ADA-5A781B329E02}" type="datetimeFigureOut">
               <a:rPr lang="en-US"/>
-              <a:t>4/25/2015</a:t>
+              <a:t>5/2/2015</a:t>
             </a:fld>
             <a:endParaRPr/>
           </a:p>
@@ -4007,7 +3317,7 @@
           <a:p>
             <a:fld id="{F2D8D46A-B586-417D-BFBD-8C8FE0AAF762}" type="datetimeFigureOut">
               <a:rPr lang="en-US"/>
-              <a:t>4/25/2015</a:t>
+              <a:t>5/2/2015</a:t>
             </a:fld>
             <a:endParaRPr/>
           </a:p>
@@ -5030,7 +4340,7 @@
           <a:p>
             <a:fld id="{F0DFD029-FB74-4578-B929-F66AA97659CA}" type="datetimeFigureOut">
               <a:rPr lang="en-US"/>
-              <a:t>4/25/2015</a:t>
+              <a:t>5/2/2015</a:t>
             </a:fld>
             <a:endParaRPr/>
           </a:p>
@@ -5235,7 +4545,7 @@
           <a:p>
             <a:fld id="{F0DFD029-FB74-4578-B929-F66AA97659CA}" type="datetimeFigureOut">
               <a:rPr lang="en-US"/>
-              <a:t>4/25/2015</a:t>
+              <a:t>5/2/2015</a:t>
             </a:fld>
             <a:endParaRPr/>
           </a:p>
@@ -5450,7 +4760,7 @@
           <a:p>
             <a:fld id="{F0DFD029-FB74-4578-B929-F66AA97659CA}" type="datetimeFigureOut">
               <a:rPr lang="en-US"/>
-              <a:t>4/25/2015</a:t>
+              <a:t>5/2/2015</a:t>
             </a:fld>
             <a:endParaRPr/>
           </a:p>
@@ -5655,7 +4965,7 @@
           <a:p>
             <a:fld id="{F0DFD029-FB74-4578-B929-F66AA97659CA}" type="datetimeFigureOut">
               <a:rPr lang="en-US"/>
-              <a:t>4/25/2015</a:t>
+              <a:t>5/2/2015</a:t>
             </a:fld>
             <a:endParaRPr/>
           </a:p>
@@ -5925,7 +5235,7 @@
           <a:p>
             <a:fld id="{F0DFD029-FB74-4578-B929-F66AA97659CA}" type="datetimeFigureOut">
               <a:rPr lang="en-US"/>
-              <a:t>4/25/2015</a:t>
+              <a:t>5/2/2015</a:t>
             </a:fld>
             <a:endParaRPr/>
           </a:p>
@@ -6405,7 +5715,7 @@
           <a:p>
             <a:fld id="{F0DFD029-FB74-4578-B929-F66AA97659CA}" type="datetimeFigureOut">
               <a:rPr lang="en-US"/>
-              <a:t>4/25/2015</a:t>
+              <a:t>5/2/2015</a:t>
             </a:fld>
             <a:endParaRPr/>
           </a:p>
@@ -6868,7 +6178,7 @@
           <a:p>
             <a:fld id="{F0DFD029-FB74-4578-B929-F66AA97659CA}" type="datetimeFigureOut">
               <a:rPr lang="en-US"/>
-              <a:t>4/25/2015</a:t>
+              <a:t>5/2/2015</a:t>
             </a:fld>
             <a:endParaRPr/>
           </a:p>
@@ -7005,7 +6315,7 @@
           <a:p>
             <a:fld id="{F0DFD029-FB74-4578-B929-F66AA97659CA}" type="datetimeFigureOut">
               <a:rPr lang="en-US"/>
-              <a:t>4/25/2015</a:t>
+              <a:t>5/2/2015</a:t>
             </a:fld>
             <a:endParaRPr/>
           </a:p>
@@ -7119,7 +6429,7 @@
           <a:p>
             <a:fld id="{F0DFD029-FB74-4578-B929-F66AA97659CA}" type="datetimeFigureOut">
               <a:rPr lang="en-US"/>
-              <a:t>4/25/2015</a:t>
+              <a:t>5/2/2015</a:t>
             </a:fld>
             <a:endParaRPr/>
           </a:p>
@@ -7425,7 +6735,7 @@
           <a:p>
             <a:fld id="{F0DFD029-FB74-4578-B929-F66AA97659CA}" type="datetimeFigureOut">
               <a:rPr lang="en-US"/>
-              <a:t>4/25/2015</a:t>
+              <a:t>5/2/2015</a:t>
             </a:fld>
             <a:endParaRPr/>
           </a:p>
@@ -7720,7 +7030,7 @@
           <a:p>
             <a:fld id="{F0DFD029-FB74-4578-B929-F66AA97659CA}" type="datetimeFigureOut">
               <a:rPr lang="en-US"/>
-              <a:t>4/25/2015</a:t>
+              <a:t>5/2/2015</a:t>
             </a:fld>
             <a:endParaRPr/>
           </a:p>
@@ -8350,7 +7660,7 @@
             <a:fld id="{F0DFD029-FB74-4578-B929-F66AA97659CA}" type="datetimeFigureOut">
               <a:rPr lang="en-US"/>
               <a:pPr/>
-              <a:t>4/25/2015</a:t>
+              <a:t>5/2/2015</a:t>
             </a:fld>
             <a:endParaRPr/>
           </a:p>
@@ -9983,15 +9293,66 @@
       </p:sp>
       <p:sp>
         <p:nvSpPr>
-          <p:cNvPr id="4" name="Picture Placeholder 3"/>
-          <p:cNvSpPr>
-            <a:spLocks noGrp="1"/>
-          </p:cNvSpPr>
-          <p:nvPr>
-            <p:ph type="pic" idx="1"/>
-          </p:nvPr>
+          <p:cNvPr id="6" name="Rounded Rectangle 5"/>
+          <p:cNvSpPr/>
+          <p:nvPr/>
         </p:nvSpPr>
-        <p:spPr/>
+        <p:spPr>
+          <a:xfrm>
+            <a:off x="5281824" y="914400"/>
+            <a:ext cx="4876800" cy="1295400"/>
+          </a:xfrm>
+          <a:prstGeom prst="roundRect">
+            <a:avLst/>
+          </a:prstGeom>
+        </p:spPr>
+        <p:style>
+          <a:lnRef idx="2">
+            <a:schemeClr val="accent4">
+              <a:shade val="50000"/>
+            </a:schemeClr>
+          </a:lnRef>
+          <a:fillRef idx="1">
+            <a:schemeClr val="accent4"/>
+          </a:fillRef>
+          <a:effectRef idx="0">
+            <a:schemeClr val="accent4"/>
+          </a:effectRef>
+          <a:fontRef idx="minor">
+            <a:schemeClr val="lt1"/>
+          </a:fontRef>
+        </p:style>
+        <p:txBody>
+          <a:bodyPr rtlCol="0" anchor="ctr"/>
+          <a:lstStyle/>
+          <a:p>
+            <a:pPr algn="ctr"/>
+            <a:r>
+              <a:rPr lang="en-US" sz="2800" dirty="0" smtClean="0"/>
+              <a:t>How’s My Driving?</a:t>
+            </a:r>
+          </a:p>
+          <a:p>
+            <a:pPr algn="ctr"/>
+            <a:r>
+              <a:rPr lang="en-US" sz="2800" dirty="0">
+                <a:hlinkClick r:id="rId2"/>
+              </a:rPr>
+              <a:t>http://</a:t>
+            </a:r>
+            <a:r>
+              <a:rPr lang="en-US" sz="2800" dirty="0" smtClean="0">
+                <a:hlinkClick r:id="rId2"/>
+              </a:rPr>
+              <a:t>bit.ly/next-likness-2</a:t>
+            </a:r>
+            <a:r>
+              <a:rPr lang="en-US" sz="2800" dirty="0" smtClean="0"/>
+              <a:t> </a:t>
+            </a:r>
+            <a:endParaRPr lang="en-US" sz="2800" dirty="0"/>
+          </a:p>
+        </p:txBody>
       </p:sp>
     </p:spTree>
     <p:extLst>

</xml_diff>